<commit_message>
made changes along the suggestions made in Digital Lab
</commit_message>
<xml_diff>
--- a/assignments/pabbisetty/week-17-presentation/Only One Out of Five Archived Web Pages.pptx
+++ b/assignments/pabbisetty/week-17-presentation/Only One Out of Five Archived Web Pages.pptx
@@ -130,6 +130,489 @@
 </p:presentation>
 </file>
 
+<file path=ppt/ink/ink1.xml><?xml version="1.0" encoding="utf-8"?>
+<inkml:ink xmlns:inkml="http://www.w3.org/2003/InkML">
+  <inkml:definitions>
+    <inkml:context xml:id="ctx0">
+      <inkml:inkSource xml:id="inkSrc0">
+        <inkml:traceFormat>
+          <inkml:channel name="X" type="integer" max="1920" units="cm"/>
+          <inkml:channel name="Y" type="integer" max="1080" units="cm"/>
+          <inkml:channel name="T" type="integer" max="2.14748E9" units="dev"/>
+        </inkml:traceFormat>
+        <inkml:channelProperties>
+          <inkml:channelProperty channel="X" name="resolution" value="36.15819" units="1/cm"/>
+          <inkml:channelProperty channel="Y" name="resolution" value="36.1204" units="1/cm"/>
+          <inkml:channelProperty channel="T" name="resolution" value="1" units="1/dev"/>
+        </inkml:channelProperties>
+      </inkml:inkSource>
+      <inkml:timestamp xml:id="ts0" timeString="2019-05-09T03:47:59.959"/>
+    </inkml:context>
+    <inkml:brush xml:id="br0">
+      <inkml:brushProperty name="width" value="0.06667" units="cm"/>
+      <inkml:brushProperty name="height" value="0.06667" units="cm"/>
+      <inkml:brushProperty name="color" value="#ED1C24"/>
+      <inkml:brushProperty name="fitToCurve" value="1"/>
+    </inkml:brush>
+  </inkml:definitions>
+  <inkml:traceGroup>
+    <inkml:annotationXML>
+      <emma:emma xmlns:emma="http://www.w3.org/2003/04/emma" version="1.0">
+        <emma:interpretation id="{A6EB523D-C268-4FB3-B1A0-00987F71BD76}" emma:medium="tactile" emma:mode="ink">
+          <msink:context xmlns:msink="http://schemas.microsoft.com/ink/2010/main" type="writingRegion" rotatedBoundingBox="17222,14962 10891,14495 11239,9767 17571,10234"/>
+        </emma:interpretation>
+      </emma:emma>
+    </inkml:annotationXML>
+    <inkml:traceGroup>
+      <inkml:annotationXML>
+        <emma:emma xmlns:emma="http://www.w3.org/2003/04/emma" version="1.0">
+          <emma:interpretation id="{43C97323-23B6-44F6-8E2D-019F0FAEFC88}" emma:medium="tactile" emma:mode="ink">
+            <msink:context xmlns:msink="http://schemas.microsoft.com/ink/2010/main" type="paragraph" rotatedBoundingBox="17222,14962 10891,14495 11239,9767 17571,10234" alignmentLevel="1"/>
+          </emma:interpretation>
+        </emma:emma>
+      </inkml:annotationXML>
+      <inkml:traceGroup>
+        <inkml:annotationXML>
+          <emma:emma xmlns:emma="http://www.w3.org/2003/04/emma" version="1.0">
+            <emma:interpretation id="{95F11762-6B96-4625-854E-5E028A6B82DF}" emma:medium="tactile" emma:mode="ink">
+              <msink:context xmlns:msink="http://schemas.microsoft.com/ink/2010/main" type="line" rotatedBoundingBox="17222,14962 10891,14495 11239,9767 17571,10234"/>
+            </emma:interpretation>
+          </emma:emma>
+        </inkml:annotationXML>
+        <inkml:traceGroup>
+          <inkml:annotationXML>
+            <emma:emma xmlns:emma="http://www.w3.org/2003/04/emma" version="1.0">
+              <emma:interpretation id="{24E5364F-7859-4F3A-9C31-DAF3A5293216}" emma:medium="tactile" emma:mode="ink">
+                <msink:context xmlns:msink="http://schemas.microsoft.com/ink/2010/main" type="inkWord" rotatedBoundingBox="17222,14962 10891,14495 11239,9767 17571,10234"/>
+              </emma:interpretation>
+              <emma:one-of disjunction-type="recognition" id="oneOf0">
+                <emma:interpretation id="interp0" emma:lang="" emma:confidence="0">
+                  <emma:literal>☺</emma:literal>
+                </emma:interpretation>
+                <emma:interpretation id="interp1" emma:lang="" emma:confidence="0">
+                  <emma:literal>•</emma:literal>
+                </emma:interpretation>
+                <emma:interpretation id="interp2" emma:lang="" emma:confidence="0">
+                  <emma:literal>e</emma:literal>
+                </emma:interpretation>
+                <emma:interpretation id="interp3" emma:lang="" emma:confidence="0">
+                  <emma:literal>O</emma:literal>
+                </emma:interpretation>
+                <emma:interpretation id="interp4" emma:lang="" emma:confidence="0">
+                  <emma:literal>0</emma:literal>
+                </emma:interpretation>
+              </emma:one-of>
+            </emma:emma>
+          </inkml:annotationXML>
+          <inkml:trace contextRef="#ctx0" brushRef="#br0">5342 305 0,'-23'0'203,"-23"0"-141,-115 0-62,-1-46 16,-46 23-16,23-1 16,-46 1-16,24-23 15,-24 23-15,23 0 16,69 0-16,47 23 16,0-46-16,-24 23 15,70 23-15,0 0 16,0 0-1,-1 0 1,24 0-16,0 0 16,-23 0-16,-23 0 15,23 0-15,-24 0 16,-22 0-16,0 0 16,-1 0-16,-22 0 15,22 0-15,24 0 16,-23 0-1,69 0-15,-47 0 16,1 0-16,0 0 16,23 0-16,0 0 15,-1 0-15,1 0 16,23 0-16,-23 0 16,23 0-16,-23 0 15,23 23-15,-24-23 16,1 0-16,0 0 15,23 23-15,-23-23 16,0 0-16,-1 0 16,1 0-16,-23 46 15,46-23-15,-23-23 16,-24 0-16,47 23 16,-46 0-16,46-23 15,0 23-15,-23 0 16,-1-23-1,1 0-15,0 24 16,46-1-16,-46 0 16,23 0-16,0-23 15,0 23-15,0-23 16,23 23-16,-47 23 16,1-23-16,46 0 15,-23 0-15,-69 93 16,22-47-1,70-46 1,-23 23-16,0-22 16,-23 22-16,46-23 15,0 0-15,-46 23 16,46-23-16,-23 46 16,0-69-16,0 47 15,23-24-15,0 46 16,-23-46-1,23 46-15,0-46 16,-24 24-16,24-24 16,0 46-16,0-46 15,0 23-15,0-23 16,0 24-16,0 22 16,0-23-16,0 23 15,0 1 1,0-47-16,0 23 15,0 0-15,0 23 16,0-23 0,0-22-16,0 22 15,0 0-15,0-23 16,24 23 0,-1 23-16,-23-45 15,23 22-15,-23-23 16,23 46-16,0 0 15,-23-46-15,0 24 16,23-1-16,0 0 16,-23-23-1,23 0-15,0 0 16,-23 23-16,0-22 16,23-1-16,0 23 15,1-23-15,-1 0 16,0 69-16,23-69 15,-23 24-15,-23-1 16,46 0-16,-23 0 16,23 23-1,-22-69-15,-1 24 16,23 22-16,-46-23 16,23 23-16,23 0 15,-23 0 1,0-23-16,0 1 15,24 22 1,-24 0-16,0-23 16,0 0-16,23 23 15,0 0-15,0 1 16,1-24-16,22 46 16,-46-23-16,46 0 15,-69 1-15,69-24 16,-22 46-16,-1-69 15,0 69-15,23-46 16,-23 0-16,24 24 16,-47-24-16,69 0 15,-46 23-15,-23-23 16,24-23-16,-1 23 16,-23 23-16,46-23 15,-23 0-15,-23 1 16,1-24-16,22 23 15,46 0-15,-69-23 16,46 23-16,-45-23 16,-1 0-16,46 23 15,-23-23-15,-23 0 16,23 0-16,24 0 16,-24 23-16,23-23 15,0 0-15,47 46 16,-47-46-1,47 0-15,-1 23 16,-46-23-16,47 23 16,-47-23-16,23 0 15,-45 23-15,-24-23 16,46 0-16,0 0 16,24 0-16,-47 0 15,0 0 1,23-46-16,-23 46 15,1 0 1,-24 0-16,0-23 16,46 0-16,23 0 15,-69 0-15,47 0 16,-1 23-16,23-23 16,-45 0-16,22 23 15,0-23-15,0-1 16,-22 24-16,-1 0 15,0-69-15,0 69 16,0-23-16,-23 0 16,24 0-16,-47 0 15,69-23 1,-46 46-16,0-23 16,23-24-16,0 1 15,1 23-15,-1-46 16,46 23-16,-69 23 15,46-1-15,-22-22 16,-24 0 0,46 0-16,-69 23 15,23 23-15,0-23 16,0 0-16,-23-47 16,23 70-16,0-23 15,-23-23-15,24 23 16,-1-23-16,0 0 15,0 23-15,0-24 16,-23-22-16,46 23 16,-46 0-16,0 23 15,23-24-15,23 1 16,-46 0-16,23-23 16,-23 46-16,24-47 15,-1 24-15,-23-23 16,23 46-16,0-23 15,-23 0 1,0-1-16,0 1 16,46 23-16,-23-46 15,-23 23 1,0 23-16,0-1 16,0-22-16,23 23 15,-23 0 1,0 0-1,0 0-15,0 0 32,0 0-32,0 0 31,0-24-31,0 24 16,0 0-16,0 0 15,0 0-15,0-23 16,0 23-1,0-23-15,0 23 16,0-24 0,0 24-1,0-23 1,0 23-16,0-23 31,0 23-15,0-23-1,0 22-15,0-22 16,0 23 0,0-23-1,0 23 1,0-23 0,0 23-16,0-24 15,0 24 1,-23-23-1,23 23 1,-23 23-16,23-46 16,0 0-1,-23 0 1,23 22 0,-46 1-1,46 0-15,0 0 16,0 0-16,0-23 15,-23 46 1,23-46 0,0 23-16,0 0 15,-47-24 1,24 1 15,0 23-31,23 0 16,-23 0-16,0-23 15,0 0-15,-23-1 16,46 24-16,-23 0 16,0-23-16,0 23 15,-1 0-15,1 23 16,23-23 0,-23 23 15,23-23 16,-23 0 15,0 23-15,0 0-47,0-24 16,0 24-16,-23-23 15,-1 0 1,24 23-16,-46-23 16,46 23-16,0 0 15,-23 0-15,0-46 16,-1 46-16,24 0 15,-23 0-15,-23-23 16,0 23-16,45 0 16,-45-23-16,46 23 15,-23 0 1,23 0-16,0-23 16,0 23-1,0 0 1</inkml:trace>
+        </inkml:traceGroup>
+      </inkml:traceGroup>
+    </inkml:traceGroup>
+  </inkml:traceGroup>
+</inkml:ink>
+</file>
+
+<file path=ppt/ink/ink10.xml><?xml version="1.0" encoding="utf-8"?>
+<inkml:ink xmlns:inkml="http://www.w3.org/2003/InkML">
+  <inkml:definitions>
+    <inkml:context xml:id="ctx0">
+      <inkml:inkSource xml:id="inkSrc0">
+        <inkml:traceFormat>
+          <inkml:channel name="X" type="integer" max="1920" units="cm"/>
+          <inkml:channel name="Y" type="integer" max="1080" units="cm"/>
+          <inkml:channel name="T" type="integer" max="2.14748E9" units="dev"/>
+        </inkml:traceFormat>
+        <inkml:channelProperties>
+          <inkml:channelProperty channel="X" name="resolution" value="36.15819" units="1/cm"/>
+          <inkml:channelProperty channel="Y" name="resolution" value="36.1204" units="1/cm"/>
+          <inkml:channelProperty channel="T" name="resolution" value="1" units="1/dev"/>
+        </inkml:channelProperties>
+      </inkml:inkSource>
+      <inkml:timestamp xml:id="ts0" timeString="2019-05-09T03:46:39.375"/>
+    </inkml:context>
+    <inkml:brush xml:id="br0">
+      <inkml:brushProperty name="width" value="0.06667" units="cm"/>
+      <inkml:brushProperty name="height" value="0.06667" units="cm"/>
+      <inkml:brushProperty name="color" value="#ED1C24"/>
+      <inkml:brushProperty name="fitToCurve" value="1"/>
+    </inkml:brush>
+  </inkml:definitions>
+  <inkml:traceGroup>
+    <inkml:annotationXML>
+      <emma:emma xmlns:emma="http://www.w3.org/2003/04/emma" version="1.0">
+        <emma:interpretation id="{85E63D99-C70B-4FC7-BD98-063BA0F3BA37}" emma:medium="tactile" emma:mode="ink">
+          <msink:context xmlns:msink="http://schemas.microsoft.com/ink/2010/main" type="inkDrawing"/>
+        </emma:interpretation>
+      </emma:emma>
+    </inkml:annotationXML>
+    <inkml:trace contextRef="#ctx0" brushRef="#br0">187 0 0,'-23'46'266,"0"-46"-266,0 23 15,0-23-15,23 24 16,-23-1-16,0 0 78,0 0 0,0-23-62,23 23-16</inkml:trace>
+  </inkml:traceGroup>
+</inkml:ink>
+</file>
+
+<file path=ppt/ink/ink2.xml><?xml version="1.0" encoding="utf-8"?>
+<inkml:ink xmlns:inkml="http://www.w3.org/2003/InkML">
+  <inkml:definitions>
+    <inkml:context xml:id="ctx0">
+      <inkml:inkSource xml:id="inkSrc0">
+        <inkml:traceFormat>
+          <inkml:channel name="X" type="integer" max="1920" units="cm"/>
+          <inkml:channel name="Y" type="integer" max="1080" units="cm"/>
+          <inkml:channel name="T" type="integer" max="2.14748E9" units="dev"/>
+        </inkml:traceFormat>
+        <inkml:channelProperties>
+          <inkml:channelProperty channel="X" name="resolution" value="36.15819" units="1/cm"/>
+          <inkml:channelProperty channel="Y" name="resolution" value="36.1204" units="1/cm"/>
+          <inkml:channelProperty channel="T" name="resolution" value="1" units="1/dev"/>
+        </inkml:channelProperties>
+      </inkml:inkSource>
+      <inkml:timestamp xml:id="ts0" timeString="2019-05-09T03:45:59.886"/>
+    </inkml:context>
+    <inkml:brush xml:id="br0">
+      <inkml:brushProperty name="width" value="0.06667" units="cm"/>
+      <inkml:brushProperty name="height" value="0.06667" units="cm"/>
+      <inkml:brushProperty name="color" value="#ED1C24"/>
+      <inkml:brushProperty name="fitToCurve" value="1"/>
+    </inkml:brush>
+  </inkml:definitions>
+  <inkml:traceGroup>
+    <inkml:annotationXML>
+      <emma:emma xmlns:emma="http://www.w3.org/2003/04/emma" version="1.0">
+        <emma:interpretation id="{B37380EE-C92D-478D-8831-BA171BE53E22}" emma:medium="tactile" emma:mode="ink">
+          <msink:context xmlns:msink="http://schemas.microsoft.com/ink/2010/main" type="writingRegion" rotatedBoundingBox="16694,15748 20666,15748 20666,15863 16694,15863"/>
+        </emma:interpretation>
+      </emma:emma>
+    </inkml:annotationXML>
+    <inkml:traceGroup>
+      <inkml:annotationXML>
+        <emma:emma xmlns:emma="http://www.w3.org/2003/04/emma" version="1.0">
+          <emma:interpretation id="{7B858D16-A4F3-4286-AFE9-7B7AF0B097BB}" emma:medium="tactile" emma:mode="ink">
+            <msink:context xmlns:msink="http://schemas.microsoft.com/ink/2010/main" type="paragraph" rotatedBoundingBox="16694,15748 20666,15748 20666,15863 16694,15863" alignmentLevel="1"/>
+          </emma:interpretation>
+        </emma:emma>
+      </inkml:annotationXML>
+      <inkml:traceGroup>
+        <inkml:annotationXML>
+          <emma:emma xmlns:emma="http://www.w3.org/2003/04/emma" version="1.0">
+            <emma:interpretation id="{BB8EFAC9-F446-4C32-AC25-9AC1B6DAD17B}" emma:medium="tactile" emma:mode="ink">
+              <msink:context xmlns:msink="http://schemas.microsoft.com/ink/2010/main" type="line" rotatedBoundingBox="16694,15748 20666,15748 20666,15863 16694,15863"/>
+            </emma:interpretation>
+          </emma:emma>
+        </inkml:annotationXML>
+        <inkml:traceGroup>
+          <inkml:annotationXML>
+            <emma:emma xmlns:emma="http://www.w3.org/2003/04/emma" version="1.0">
+              <emma:interpretation id="{E8D2A4FF-CC23-4E05-8854-B7EC7E3EAF16}" emma:medium="tactile" emma:mode="ink">
+                <msink:context xmlns:msink="http://schemas.microsoft.com/ink/2010/main" type="inkWord" rotatedBoundingBox="16694,15840 17780,15840 17780,15863 16694,15863"/>
+              </emma:interpretation>
+              <emma:one-of disjunction-type="recognition" id="oneOf0">
+                <emma:interpretation id="interp0" emma:lang="" emma:confidence="1">
+                  <emma:literal/>
+                </emma:interpretation>
+              </emma:one-of>
+            </emma:emma>
+          </inkml:annotationXML>
+          <inkml:trace contextRef="#ctx0" brushRef="#br0">2933 67 0,'0'-40'63,"88"40"-1,88 0-62,87 0 16,92 0-16,-91 0 15,-88-39-15,0 39 16,-85 0-16,85 0 16,0-40-16,-88 40 15,-1 0 1,1 0-16,88 0 16,-88 0-1,4 0 1,-5 0-16,1 0 31,0 0 0,0 0-15,0 0 15,0 0-15,0 0 15,-1 0 32,1 0-48,0 0 1,4 0-1,-4 0 1,0 0 0,-1-40 31,1 40 31,0 0 0</inkml:trace>
+        </inkml:traceGroup>
+        <inkml:traceGroup>
+          <inkml:annotationXML>
+            <emma:emma xmlns:emma="http://www.w3.org/2003/04/emma" version="1.0">
+              <emma:interpretation id="{AF658FC3-8CB9-406D-94B4-A6B3C1FAD733}" emma:medium="tactile" emma:mode="ink">
+                <msink:context xmlns:msink="http://schemas.microsoft.com/ink/2010/main" type="inkWord" rotatedBoundingBox="19627,15748 20666,15748 20666,15840 19627,15840"/>
+              </emma:interpretation>
+              <emma:one-of disjunction-type="recognition" id="oneOf1">
+                <emma:interpretation id="interp1" emma:lang="" emma:confidence="0">
+                  <emma:literal>_</emma:literal>
+                </emma:interpretation>
+                <emma:interpretation id="interp2" emma:lang="" emma:confidence="0">
+                  <emma:literal>-</emma:literal>
+                </emma:interpretation>
+                <emma:interpretation id="interp3" emma:lang="" emma:confidence="0">
+                  <emma:literal>~</emma:literal>
+                </emma:interpretation>
+                <emma:interpretation id="interp4" emma:lang="" emma:confidence="0">
+                  <emma:literal>=</emma:literal>
+                </emma:interpretation>
+                <emma:interpretation id="interp5" emma:lang="" emma:confidence="0">
+                  <emma:literal>.</emma:literal>
+                </emma:interpretation>
+              </emma:one-of>
+            </emma:emma>
+          </inkml:annotationXML>
+          <inkml:trace contextRef="#ctx0" brushRef="#br0">2933 67 0,'0'-40'63,"88"40"-1,88 0-62,87 0 16,92 0-16,-91 0 15,-88-39-15,0 39 16,-85 0-16,85 0 16,0-40-16,-88 40 15,-1 0 1,1 0-16,88 0 16,-88 0-1,4 0 1,-5 0-16,1 0 31,0 0 0,0 0-15,0 0 15,0 0-15,0 0 15,-1 0 32,1 0-48,0 0 1,4 0-1,-4 0 1,0 0 0,-1-40 31,1 40 31,0 0 0</inkml:trace>
+        </inkml:traceGroup>
+      </inkml:traceGroup>
+    </inkml:traceGroup>
+  </inkml:traceGroup>
+</inkml:ink>
+</file>
+
+<file path=ppt/ink/ink3.xml><?xml version="1.0" encoding="utf-8"?>
+<inkml:ink xmlns:inkml="http://www.w3.org/2003/InkML">
+  <inkml:definitions>
+    <inkml:context xml:id="ctx0">
+      <inkml:inkSource xml:id="inkSrc0">
+        <inkml:traceFormat>
+          <inkml:channel name="X" type="integer" max="1920" units="cm"/>
+          <inkml:channel name="Y" type="integer" max="1080" units="cm"/>
+          <inkml:channel name="T" type="integer" max="2.14748E9" units="dev"/>
+        </inkml:traceFormat>
+        <inkml:channelProperties>
+          <inkml:channelProperty channel="X" name="resolution" value="36.15819" units="1/cm"/>
+          <inkml:channelProperty channel="Y" name="resolution" value="36.1204" units="1/cm"/>
+          <inkml:channelProperty channel="T" name="resolution" value="1" units="1/dev"/>
+        </inkml:channelProperties>
+      </inkml:inkSource>
+      <inkml:timestamp xml:id="ts0" timeString="2019-05-09T03:46:11.174"/>
+    </inkml:context>
+    <inkml:brush xml:id="br0">
+      <inkml:brushProperty name="width" value="0.06667" units="cm"/>
+      <inkml:brushProperty name="height" value="0.06667" units="cm"/>
+      <inkml:brushProperty name="color" value="#ED1C24"/>
+      <inkml:brushProperty name="fitToCurve" value="1"/>
+    </inkml:brush>
+  </inkml:definitions>
+  <inkml:traceGroup>
+    <inkml:annotationXML>
+      <emma:emma xmlns:emma="http://www.w3.org/2003/04/emma" version="1.0">
+        <emma:interpretation id="{B175B434-AF7A-423A-ADD4-0F2DB0308E1F}" emma:medium="tactile" emma:mode="ink">
+          <msink:context xmlns:msink="http://schemas.microsoft.com/ink/2010/main" type="inkDrawing"/>
+        </emma:interpretation>
+      </emma:emma>
+    </inkml:annotationXML>
+    <inkml:trace contextRef="#ctx0" brushRef="#br0">0 46 0,'46'-23'188,"0"0"-188,-23 23 15,24 0-15,-24 0 16,23 0-16,-23 0 31,23 0-15,-23 0-1,23 0-15,1 0 16,22 0-16,0 0 16,0 0-16,-22 0 15,22 0-15,23 0 16,-22 0-16,-1 0 16,-46 0-16,23 0 15,-23 0 1,0 0-16,23 0 15,-22 0 1,22 0 0,-23 0-1,0 0 1,0 0-16,0 0 16,0 0-16,0 0 15</inkml:trace>
+  </inkml:traceGroup>
+</inkml:ink>
+</file>
+
+<file path=ppt/ink/ink4.xml><?xml version="1.0" encoding="utf-8"?>
+<inkml:ink xmlns:inkml="http://www.w3.org/2003/InkML">
+  <inkml:definitions>
+    <inkml:context xml:id="ctx0">
+      <inkml:inkSource xml:id="inkSrc0">
+        <inkml:traceFormat>
+          <inkml:channel name="X" type="integer" max="1920" units="cm"/>
+          <inkml:channel name="Y" type="integer" max="1080" units="cm"/>
+          <inkml:channel name="T" type="integer" max="2.14748E9" units="dev"/>
+        </inkml:traceFormat>
+        <inkml:channelProperties>
+          <inkml:channelProperty channel="X" name="resolution" value="36.15819" units="1/cm"/>
+          <inkml:channelProperty channel="Y" name="resolution" value="36.1204" units="1/cm"/>
+          <inkml:channelProperty channel="T" name="resolution" value="1" units="1/dev"/>
+        </inkml:channelProperties>
+      </inkml:inkSource>
+      <inkml:timestamp xml:id="ts0" timeString="2019-05-09T03:46:13.031"/>
+    </inkml:context>
+    <inkml:brush xml:id="br0">
+      <inkml:brushProperty name="width" value="0.06667" units="cm"/>
+      <inkml:brushProperty name="height" value="0.06667" units="cm"/>
+      <inkml:brushProperty name="color" value="#ED1C24"/>
+      <inkml:brushProperty name="fitToCurve" value="1"/>
+    </inkml:brush>
+  </inkml:definitions>
+  <inkml:traceGroup>
+    <inkml:annotationXML>
+      <emma:emma xmlns:emma="http://www.w3.org/2003/04/emma" version="1.0">
+        <emma:interpretation id="{999AB1FE-4FFB-4D23-BAAB-CAD42F20565E}" emma:medium="tactile" emma:mode="ink">
+          <msink:context xmlns:msink="http://schemas.microsoft.com/ink/2010/main" type="inkDrawing"/>
+        </emma:interpretation>
+      </emma:emma>
+    </inkml:annotationXML>
+    <inkml:trace contextRef="#ctx0" brushRef="#br0">0 161 0,'0'-23'234,"23"0"-234,23 23 16,-23 0-16,47 0 16,-1 0-16,-46 0 15,23 0-15,-23 0 16,0 0-16,24 0 16,-24 0-1,0 0 1,0 0-1,23-23 1,-23 23 0,0-23-1,0 23-15,0 0 16,0 0-16,1 0 16,-1 0-1,23 0 1,-23 0 15,0 0-31,0 0 16,0 0-16,0-23 15,0 23 17,0 0-1,1 0 16,-1 0-32,0-23 17,0 23 46,0 0-16,0 0-31,0 0 16,23-23-15</inkml:trace>
+  </inkml:traceGroup>
+</inkml:ink>
+</file>
+
+<file path=ppt/ink/ink5.xml><?xml version="1.0" encoding="utf-8"?>
+<inkml:ink xmlns:inkml="http://www.w3.org/2003/InkML">
+  <inkml:definitions>
+    <inkml:context xml:id="ctx0">
+      <inkml:inkSource xml:id="inkSrc0">
+        <inkml:traceFormat>
+          <inkml:channel name="X" type="integer" max="1920" units="cm"/>
+          <inkml:channel name="Y" type="integer" max="1080" units="cm"/>
+          <inkml:channel name="T" type="integer" max="2.14748E9" units="dev"/>
+        </inkml:traceFormat>
+        <inkml:channelProperties>
+          <inkml:channelProperty channel="X" name="resolution" value="36.15819" units="1/cm"/>
+          <inkml:channelProperty channel="Y" name="resolution" value="36.1204" units="1/cm"/>
+          <inkml:channelProperty channel="T" name="resolution" value="1" units="1/dev"/>
+        </inkml:channelProperties>
+      </inkml:inkSource>
+      <inkml:timestamp xml:id="ts0" timeString="2019-05-09T03:46:32.638"/>
+    </inkml:context>
+    <inkml:brush xml:id="br0">
+      <inkml:brushProperty name="width" value="0.06667" units="cm"/>
+      <inkml:brushProperty name="height" value="0.06667" units="cm"/>
+      <inkml:brushProperty name="color" value="#ED1C24"/>
+      <inkml:brushProperty name="fitToCurve" value="1"/>
+    </inkml:brush>
+  </inkml:definitions>
+  <inkml:traceGroup>
+    <inkml:annotationXML>
+      <emma:emma xmlns:emma="http://www.w3.org/2003/04/emma" version="1.0">
+        <emma:interpretation id="{7DA26040-FFC2-4F07-A087-B5FA57FB4191}" emma:medium="tactile" emma:mode="ink">
+          <msink:context xmlns:msink="http://schemas.microsoft.com/ink/2010/main" type="inkDrawing"/>
+        </emma:interpretation>
+      </emma:emma>
+    </inkml:annotationXML>
+    <inkml:trace contextRef="#ctx0" brushRef="#br0">0 23 0,'0'-23'31,"24"23"-15,-1 0 47,0 23-48,-23 0 1,0 46-1,0-22-15,0-24 16,0 0-16,0 0 16,0 0-16,0 0 15,0 0 17,0 0-17,0 0-15,0 0 31,0 1-15,0-1 0,0 0-1,0 0-15,0 0 16,0 0 0,0 0-1,0 0 1,0 23-1,0-23 17,0 24-17,0-24 1,0 0 156</inkml:trace>
+  </inkml:traceGroup>
+</inkml:ink>
+</file>
+
+<file path=ppt/ink/ink6.xml><?xml version="1.0" encoding="utf-8"?>
+<inkml:ink xmlns:inkml="http://www.w3.org/2003/InkML">
+  <inkml:definitions>
+    <inkml:context xml:id="ctx0">
+      <inkml:inkSource xml:id="inkSrc0">
+        <inkml:traceFormat>
+          <inkml:channel name="X" type="integer" max="1920" units="cm"/>
+          <inkml:channel name="Y" type="integer" max="1080" units="cm"/>
+          <inkml:channel name="T" type="integer" max="2.14748E9" units="dev"/>
+        </inkml:traceFormat>
+        <inkml:channelProperties>
+          <inkml:channelProperty channel="X" name="resolution" value="36.15819" units="1/cm"/>
+          <inkml:channelProperty channel="Y" name="resolution" value="36.1204" units="1/cm"/>
+          <inkml:channelProperty channel="T" name="resolution" value="1" units="1/dev"/>
+        </inkml:channelProperties>
+      </inkml:inkSource>
+      <inkml:timestamp xml:id="ts0" timeString="2019-05-09T03:46:33.559"/>
+    </inkml:context>
+    <inkml:brush xml:id="br0">
+      <inkml:brushProperty name="width" value="0.06667" units="cm"/>
+      <inkml:brushProperty name="height" value="0.06667" units="cm"/>
+      <inkml:brushProperty name="color" value="#ED1C24"/>
+      <inkml:brushProperty name="fitToCurve" value="1"/>
+    </inkml:brush>
+  </inkml:definitions>
+  <inkml:traceGroup>
+    <inkml:annotationXML>
+      <emma:emma xmlns:emma="http://www.w3.org/2003/04/emma" version="1.0">
+        <emma:interpretation id="{4BEA5A75-F3D9-4C4B-AEB2-01B1EE8FDF8E}" emma:medium="tactile" emma:mode="ink">
+          <msink:context xmlns:msink="http://schemas.microsoft.com/ink/2010/main" type="inkDrawing"/>
+        </emma:interpretation>
+      </emma:emma>
+    </inkml:annotationXML>
+    <inkml:trace contextRef="#ctx0" brushRef="#br0">96 0 0,'23'0'94,"-23"23"-78,0 23-16,-23 0 15,-1 1-15,1-24 16,23 0-16,-23 0 16,23 0-16,-23-23 15,23 23-15</inkml:trace>
+  </inkml:traceGroup>
+</inkml:ink>
+</file>
+
+<file path=ppt/ink/ink7.xml><?xml version="1.0" encoding="utf-8"?>
+<inkml:ink xmlns:inkml="http://www.w3.org/2003/InkML">
+  <inkml:definitions>
+    <inkml:context xml:id="ctx0">
+      <inkml:inkSource xml:id="inkSrc0">
+        <inkml:traceFormat>
+          <inkml:channel name="X" type="integer" max="1920" units="cm"/>
+          <inkml:channel name="Y" type="integer" max="1080" units="cm"/>
+          <inkml:channel name="T" type="integer" max="2.14748E9" units="dev"/>
+        </inkml:traceFormat>
+        <inkml:channelProperties>
+          <inkml:channelProperty channel="X" name="resolution" value="36.15819" units="1/cm"/>
+          <inkml:channelProperty channel="Y" name="resolution" value="36.1204" units="1/cm"/>
+          <inkml:channelProperty channel="T" name="resolution" value="1" units="1/dev"/>
+        </inkml:channelProperties>
+      </inkml:inkSource>
+      <inkml:timestamp xml:id="ts0" timeString="2019-05-09T03:46:34.711"/>
+    </inkml:context>
+    <inkml:brush xml:id="br0">
+      <inkml:brushProperty name="width" value="0.06667" units="cm"/>
+      <inkml:brushProperty name="height" value="0.06667" units="cm"/>
+      <inkml:brushProperty name="color" value="#ED1C24"/>
+      <inkml:brushProperty name="fitToCurve" value="1"/>
+    </inkml:brush>
+  </inkml:definitions>
+  <inkml:traceGroup>
+    <inkml:annotationXML>
+      <emma:emma xmlns:emma="http://www.w3.org/2003/04/emma" version="1.0">
+        <emma:interpretation id="{07AFB656-98CD-47C4-B254-0B55730FA6D7}" emma:medium="tactile" emma:mode="ink">
+          <msink:context xmlns:msink="http://schemas.microsoft.com/ink/2010/main" type="inkDrawing"/>
+        </emma:interpretation>
+      </emma:emma>
+    </inkml:annotationXML>
+    <inkml:trace contextRef="#ctx0" brushRef="#br0">0 0 0,'23'0'94,"0"0"-63,0 0-15,23 23 31,-23-23-16,0 23 0,0 1-15,1-24 0,-24 23 30,23-23 1,-23 23-31,23 0 0,-23 0 202</inkml:trace>
+  </inkml:traceGroup>
+</inkml:ink>
+</file>
+
+<file path=ppt/ink/ink8.xml><?xml version="1.0" encoding="utf-8"?>
+<inkml:ink xmlns:inkml="http://www.w3.org/2003/InkML">
+  <inkml:definitions>
+    <inkml:context xml:id="ctx0">
+      <inkml:inkSource xml:id="inkSrc0">
+        <inkml:traceFormat>
+          <inkml:channel name="X" type="integer" max="1920" units="cm"/>
+          <inkml:channel name="Y" type="integer" max="1080" units="cm"/>
+          <inkml:channel name="T" type="integer" max="2.14748E9" units="dev"/>
+        </inkml:traceFormat>
+        <inkml:channelProperties>
+          <inkml:channelProperty channel="X" name="resolution" value="36.15819" units="1/cm"/>
+          <inkml:channelProperty channel="Y" name="resolution" value="36.1204" units="1/cm"/>
+          <inkml:channelProperty channel="T" name="resolution" value="1" units="1/dev"/>
+        </inkml:channelProperties>
+      </inkml:inkSource>
+      <inkml:timestamp xml:id="ts0" timeString="2019-05-09T03:46:36.326"/>
+    </inkml:context>
+    <inkml:brush xml:id="br0">
+      <inkml:brushProperty name="width" value="0.06667" units="cm"/>
+      <inkml:brushProperty name="height" value="0.06667" units="cm"/>
+      <inkml:brushProperty name="color" value="#ED1C24"/>
+      <inkml:brushProperty name="fitToCurve" value="1"/>
+    </inkml:brush>
+  </inkml:definitions>
+  <inkml:traceGroup>
+    <inkml:annotationXML>
+      <emma:emma xmlns:emma="http://www.w3.org/2003/04/emma" version="1.0">
+        <emma:interpretation id="{C57641D2-C018-4C7C-89D4-E997EB91BAE9}" emma:medium="tactile" emma:mode="ink">
+          <msink:context xmlns:msink="http://schemas.microsoft.com/ink/2010/main" type="inkDrawing"/>
+        </emma:interpretation>
+      </emma:emma>
+    </inkml:annotationXML>
+    <inkml:trace contextRef="#ctx0" brushRef="#br0">1 23 0,'0'-23'94,"0"69"-63,0 0-31,0-23 16,0 0-16,0 1 15,0 22 1,0-23-16,0 0 16,0 0-1,0 0-15,23 0 16,-23 0-1,0 0-15,0 0 16,0 1 0,0-1-1,0 0 1,0 0-16,0 0 16,0 0-1,0 0-15,0 0 16,0 0-1,0 0-15,0 0 16,0 1 0,0-1-16,0 0 31,0 0-15,0 0 15</inkml:trace>
+  </inkml:traceGroup>
+</inkml:ink>
+</file>
+
+<file path=ppt/ink/ink9.xml><?xml version="1.0" encoding="utf-8"?>
+<inkml:ink xmlns:inkml="http://www.w3.org/2003/InkML">
+  <inkml:definitions>
+    <inkml:context xml:id="ctx0">
+      <inkml:inkSource xml:id="inkSrc0">
+        <inkml:traceFormat>
+          <inkml:channel name="X" type="integer" max="1920" units="cm"/>
+          <inkml:channel name="Y" type="integer" max="1080" units="cm"/>
+          <inkml:channel name="T" type="integer" max="2.14748E9" units="dev"/>
+        </inkml:traceFormat>
+        <inkml:channelProperties>
+          <inkml:channelProperty channel="X" name="resolution" value="36.15819" units="1/cm"/>
+          <inkml:channelProperty channel="Y" name="resolution" value="36.1204" units="1/cm"/>
+          <inkml:channelProperty channel="T" name="resolution" value="1" units="1/dev"/>
+        </inkml:channelProperties>
+      </inkml:inkSource>
+      <inkml:timestamp xml:id="ts0" timeString="2019-05-09T03:46:37.718"/>
+    </inkml:context>
+    <inkml:brush xml:id="br0">
+      <inkml:brushProperty name="width" value="0.06667" units="cm"/>
+      <inkml:brushProperty name="height" value="0.06667" units="cm"/>
+      <inkml:brushProperty name="color" value="#ED1C24"/>
+      <inkml:brushProperty name="fitToCurve" value="1"/>
+    </inkml:brush>
+  </inkml:definitions>
+  <inkml:traceGroup>
+    <inkml:annotationXML>
+      <emma:emma xmlns:emma="http://www.w3.org/2003/04/emma" version="1.0">
+        <emma:interpretation id="{0FF53F2D-B780-43F8-8F01-3EEF2339D048}" emma:medium="tactile" emma:mode="ink">
+          <msink:context xmlns:msink="http://schemas.microsoft.com/ink/2010/main" type="inkDrawing"/>
+        </emma:interpretation>
+      </emma:emma>
+    </inkml:annotationXML>
+    <inkml:trace contextRef="#ctx0" brushRef="#br0">0 0 0,'23'0'188,"1"23"-157,-1-23-15,-23 23-16,0 0 15,23-23-15,0 24 32,-23-1-1,23-23-15,-23 23-1,23-23 1,-23 23 15</inkml:trace>
+  </inkml:traceGroup>
+</inkml:ink>
+</file>
+
 <file path=ppt/slideLayouts/slideLayout1.xml><?xml version="1.0" encoding="utf-8"?>
 <p:sldLayout xmlns:a="http://schemas.openxmlformats.org/drawingml/2006/main" xmlns:r="http://schemas.openxmlformats.org/officeDocument/2006/relationships" xmlns:p="http://schemas.openxmlformats.org/presentationml/2006/main" type="title" preserve="1">
   <p:cSld name="Title Slide">
@@ -259,7 +742,7 @@
           <a:p>
             <a:fld id="{EA0B9F1C-9B4E-43D7-95D6-537E011A2A79}" type="datetimeFigureOut">
               <a:rPr lang="en-US" smtClean="0"/>
-              <a:t>5/8/19</a:t>
+              <a:t>5/8/2019</a:t>
             </a:fld>
             <a:endParaRPr lang="en-US"/>
           </a:p>
@@ -427,7 +910,7 @@
           <a:p>
             <a:fld id="{EA0B9F1C-9B4E-43D7-95D6-537E011A2A79}" type="datetimeFigureOut">
               <a:rPr lang="en-US" smtClean="0"/>
-              <a:t>5/8/19</a:t>
+              <a:t>5/8/2019</a:t>
             </a:fld>
             <a:endParaRPr lang="en-US"/>
           </a:p>
@@ -605,7 +1088,7 @@
           <a:p>
             <a:fld id="{EA0B9F1C-9B4E-43D7-95D6-537E011A2A79}" type="datetimeFigureOut">
               <a:rPr lang="en-US" smtClean="0"/>
-              <a:t>5/8/19</a:t>
+              <a:t>5/8/2019</a:t>
             </a:fld>
             <a:endParaRPr lang="en-US"/>
           </a:p>
@@ -773,7 +1256,7 @@
           <a:p>
             <a:fld id="{EA0B9F1C-9B4E-43D7-95D6-537E011A2A79}" type="datetimeFigureOut">
               <a:rPr lang="en-US" smtClean="0"/>
-              <a:t>5/8/19</a:t>
+              <a:t>5/8/2019</a:t>
             </a:fld>
             <a:endParaRPr lang="en-US"/>
           </a:p>
@@ -1018,7 +1501,7 @@
           <a:p>
             <a:fld id="{EA0B9F1C-9B4E-43D7-95D6-537E011A2A79}" type="datetimeFigureOut">
               <a:rPr lang="en-US" smtClean="0"/>
-              <a:t>5/8/19</a:t>
+              <a:t>5/8/2019</a:t>
             </a:fld>
             <a:endParaRPr lang="en-US"/>
           </a:p>
@@ -1247,7 +1730,7 @@
           <a:p>
             <a:fld id="{EA0B9F1C-9B4E-43D7-95D6-537E011A2A79}" type="datetimeFigureOut">
               <a:rPr lang="en-US" smtClean="0"/>
-              <a:t>5/8/19</a:t>
+              <a:t>5/8/2019</a:t>
             </a:fld>
             <a:endParaRPr lang="en-US"/>
           </a:p>
@@ -1611,7 +2094,7 @@
           <a:p>
             <a:fld id="{EA0B9F1C-9B4E-43D7-95D6-537E011A2A79}" type="datetimeFigureOut">
               <a:rPr lang="en-US" smtClean="0"/>
-              <a:t>5/8/19</a:t>
+              <a:t>5/8/2019</a:t>
             </a:fld>
             <a:endParaRPr lang="en-US"/>
           </a:p>
@@ -1728,7 +2211,7 @@
           <a:p>
             <a:fld id="{EA0B9F1C-9B4E-43D7-95D6-537E011A2A79}" type="datetimeFigureOut">
               <a:rPr lang="en-US" smtClean="0"/>
-              <a:t>5/8/19</a:t>
+              <a:t>5/8/2019</a:t>
             </a:fld>
             <a:endParaRPr lang="en-US"/>
           </a:p>
@@ -1823,7 +2306,7 @@
           <a:p>
             <a:fld id="{EA0B9F1C-9B4E-43D7-95D6-537E011A2A79}" type="datetimeFigureOut">
               <a:rPr lang="en-US" smtClean="0"/>
-              <a:t>5/8/19</a:t>
+              <a:t>5/8/2019</a:t>
             </a:fld>
             <a:endParaRPr lang="en-US"/>
           </a:p>
@@ -2098,7 +2581,7 @@
           <a:p>
             <a:fld id="{EA0B9F1C-9B4E-43D7-95D6-537E011A2A79}" type="datetimeFigureOut">
               <a:rPr lang="en-US" smtClean="0"/>
-              <a:t>5/8/19</a:t>
+              <a:t>5/8/2019</a:t>
             </a:fld>
             <a:endParaRPr lang="en-US"/>
           </a:p>
@@ -2350,7 +2833,7 @@
           <a:p>
             <a:fld id="{EA0B9F1C-9B4E-43D7-95D6-537E011A2A79}" type="datetimeFigureOut">
               <a:rPr lang="en-US" smtClean="0"/>
-              <a:t>5/8/19</a:t>
+              <a:t>5/8/2019</a:t>
             </a:fld>
             <a:endParaRPr lang="en-US"/>
           </a:p>
@@ -2561,7 +3044,7 @@
           <a:p>
             <a:fld id="{EA0B9F1C-9B4E-43D7-95D6-537E011A2A79}" type="datetimeFigureOut">
               <a:rPr lang="en-US" smtClean="0"/>
-              <a:t>5/8/19</a:t>
+              <a:t>5/8/2019</a:t>
             </a:fld>
             <a:endParaRPr lang="en-US"/>
           </a:p>
@@ -3516,11 +3999,25 @@
               <a:t>Phase 2: </a:t>
             </a:r>
             <a:r>
+              <a:rPr lang="en-US" sz="2400" dirty="0" err="1" smtClean="0">
+                <a:latin typeface="Times New Roman" panose="02020603050405020304" pitchFamily="18" charset="0"/>
+                <a:cs typeface="Times New Roman" panose="02020603050405020304" pitchFamily="18" charset="0"/>
+              </a:rPr>
+              <a:t>Recomposition</a:t>
+            </a:r>
+            <a:r>
+              <a:rPr lang="en-US" sz="2400" dirty="0" smtClean="0">
+                <a:latin typeface="Times New Roman" panose="02020603050405020304" pitchFamily="18" charset="0"/>
+                <a:cs typeface="Times New Roman" panose="02020603050405020304" pitchFamily="18" charset="0"/>
+              </a:rPr>
+              <a:t> (</a:t>
+            </a:r>
+            <a:r>
               <a:rPr lang="en-US" sz="2400" dirty="0">
                 <a:latin typeface="Times New Roman" panose="02020603050405020304" pitchFamily="18" charset="0"/>
                 <a:cs typeface="Times New Roman" panose="02020603050405020304" pitchFamily="18" charset="0"/>
               </a:rPr>
-              <a:t>Recomposition(for every memento obtained above)</a:t>
+              <a:t>for every memento obtained above)</a:t>
             </a:r>
           </a:p>
           <a:p>
@@ -3788,6 +4285,357 @@
           </a:p>
         </p:txBody>
       </p:sp>
+      <mc:AlternateContent xmlns:mc="http://schemas.openxmlformats.org/markup-compatibility/2006" xmlns:p14="http://schemas.microsoft.com/office/powerpoint/2010/main">
+        <mc:Choice Requires="p14">
+          <p:contentPart p14:bwMode="auto" r:id="rId4">
+            <p14:nvContentPartPr>
+              <p14:cNvPr id="6" name="Ink 5"/>
+              <p14:cNvContentPartPr/>
+              <p14:nvPr/>
+            </p14:nvContentPartPr>
+            <p14:xfrm>
+              <a:off x="6009971" y="5669378"/>
+              <a:ext cx="1430280" cy="57960"/>
+            </p14:xfrm>
+          </p:contentPart>
+        </mc:Choice>
+        <mc:Fallback xmlns="">
+          <p:pic>
+            <p:nvPicPr>
+              <p:cNvPr id="6" name="Ink 5"/>
+              <p:cNvPicPr/>
+              <p:nvPr/>
+            </p:nvPicPr>
+            <p:blipFill>
+              <a:blip r:embed="rId5"/>
+              <a:stretch>
+                <a:fillRect/>
+              </a:stretch>
+            </p:blipFill>
+            <p:spPr>
+              <a:xfrm>
+                <a:off x="5998091" y="5657498"/>
+                <a:ext cx="1454040" cy="81720"/>
+              </a:xfrm>
+              <a:prstGeom prst="rect">
+                <a:avLst/>
+              </a:prstGeom>
+            </p:spPr>
+          </p:pic>
+        </mc:Fallback>
+      </mc:AlternateContent>
+      <mc:AlternateContent xmlns:mc="http://schemas.openxmlformats.org/markup-compatibility/2006" xmlns:p14="http://schemas.microsoft.com/office/powerpoint/2010/main">
+        <mc:Choice Requires="p14">
+          <p:contentPart p14:bwMode="auto" r:id="rId6">
+            <p14:nvContentPartPr>
+              <p14:cNvPr id="12" name="Ink 11"/>
+              <p14:cNvContentPartPr/>
+              <p14:nvPr/>
+            </p14:nvContentPartPr>
+            <p14:xfrm>
+              <a:off x="5976851" y="5868818"/>
+              <a:ext cx="482400" cy="16920"/>
+            </p14:xfrm>
+          </p:contentPart>
+        </mc:Choice>
+        <mc:Fallback xmlns="">
+          <p:pic>
+            <p:nvPicPr>
+              <p:cNvPr id="12" name="Ink 11"/>
+              <p:cNvPicPr/>
+              <p:nvPr/>
+            </p:nvPicPr>
+            <p:blipFill>
+              <a:blip r:embed="rId7"/>
+              <a:stretch>
+                <a:fillRect/>
+              </a:stretch>
+            </p:blipFill>
+            <p:spPr>
+              <a:xfrm>
+                <a:off x="5964971" y="5856938"/>
+                <a:ext cx="506160" cy="40680"/>
+              </a:xfrm>
+              <a:prstGeom prst="rect">
+                <a:avLst/>
+              </a:prstGeom>
+            </p:spPr>
+          </p:pic>
+        </mc:Fallback>
+      </mc:AlternateContent>
+      <mc:AlternateContent xmlns:mc="http://schemas.openxmlformats.org/markup-compatibility/2006" xmlns:p14="http://schemas.microsoft.com/office/powerpoint/2010/main">
+        <mc:Choice Requires="p14">
+          <p:contentPart p14:bwMode="auto" r:id="rId8">
+            <p14:nvContentPartPr>
+              <p14:cNvPr id="13" name="Ink 12"/>
+              <p14:cNvContentPartPr/>
+              <p14:nvPr/>
+            </p14:nvContentPartPr>
+            <p14:xfrm>
+              <a:off x="7074131" y="5860538"/>
+              <a:ext cx="390960" cy="58320"/>
+            </p14:xfrm>
+          </p:contentPart>
+        </mc:Choice>
+        <mc:Fallback xmlns="">
+          <p:pic>
+            <p:nvPicPr>
+              <p:cNvPr id="13" name="Ink 12"/>
+              <p:cNvPicPr/>
+              <p:nvPr/>
+            </p:nvPicPr>
+            <p:blipFill>
+              <a:blip r:embed="rId9"/>
+              <a:stretch>
+                <a:fillRect/>
+              </a:stretch>
+            </p:blipFill>
+            <p:spPr>
+              <a:xfrm>
+                <a:off x="7062251" y="5848658"/>
+                <a:ext cx="414720" cy="82080"/>
+              </a:xfrm>
+              <a:prstGeom prst="rect">
+                <a:avLst/>
+              </a:prstGeom>
+            </p:spPr>
+          </p:pic>
+        </mc:Fallback>
+      </mc:AlternateContent>
+      <mc:AlternateContent xmlns:mc="http://schemas.openxmlformats.org/markup-compatibility/2006" xmlns:p14="http://schemas.microsoft.com/office/powerpoint/2010/main">
+        <mc:Choice Requires="p14">
+          <p:contentPart p14:bwMode="auto" r:id="rId10">
+            <p14:nvContentPartPr>
+              <p14:cNvPr id="18" name="Ink 17"/>
+              <p14:cNvContentPartPr/>
+              <p14:nvPr/>
+            </p14:nvContentPartPr>
+            <p14:xfrm>
+              <a:off x="7572731" y="5419898"/>
+              <a:ext cx="27360" cy="258120"/>
+            </p14:xfrm>
+          </p:contentPart>
+        </mc:Choice>
+        <mc:Fallback xmlns="">
+          <p:pic>
+            <p:nvPicPr>
+              <p:cNvPr id="18" name="Ink 17"/>
+              <p:cNvPicPr/>
+              <p:nvPr/>
+            </p:nvPicPr>
+            <p:blipFill>
+              <a:blip r:embed="rId11"/>
+              <a:stretch>
+                <a:fillRect/>
+              </a:stretch>
+            </p:blipFill>
+            <p:spPr>
+              <a:xfrm>
+                <a:off x="7560851" y="5408018"/>
+                <a:ext cx="51120" cy="281880"/>
+              </a:xfrm>
+              <a:prstGeom prst="rect">
+                <a:avLst/>
+              </a:prstGeom>
+            </p:spPr>
+          </p:pic>
+        </mc:Fallback>
+      </mc:AlternateContent>
+      <mc:AlternateContent xmlns:mc="http://schemas.openxmlformats.org/markup-compatibility/2006" xmlns:p14="http://schemas.microsoft.com/office/powerpoint/2010/main">
+        <mc:Choice Requires="p14">
+          <p:contentPart p14:bwMode="auto" r:id="rId12">
+            <p14:nvContentPartPr>
+              <p14:cNvPr id="19" name="Ink 18"/>
+              <p14:cNvContentPartPr/>
+              <p14:nvPr/>
+            </p14:nvContentPartPr>
+            <p14:xfrm>
+              <a:off x="7546811" y="5411618"/>
+              <a:ext cx="43200" cy="100080"/>
+            </p14:xfrm>
+          </p:contentPart>
+        </mc:Choice>
+        <mc:Fallback xmlns="">
+          <p:pic>
+            <p:nvPicPr>
+              <p:cNvPr id="19" name="Ink 18"/>
+              <p:cNvPicPr/>
+              <p:nvPr/>
+            </p:nvPicPr>
+            <p:blipFill>
+              <a:blip r:embed="rId13"/>
+              <a:stretch>
+                <a:fillRect/>
+              </a:stretch>
+            </p:blipFill>
+            <p:spPr>
+              <a:xfrm>
+                <a:off x="7534931" y="5399738"/>
+                <a:ext cx="66960" cy="123840"/>
+              </a:xfrm>
+              <a:prstGeom prst="rect">
+                <a:avLst/>
+              </a:prstGeom>
+            </p:spPr>
+          </p:pic>
+        </mc:Fallback>
+      </mc:AlternateContent>
+      <mc:AlternateContent xmlns:mc="http://schemas.openxmlformats.org/markup-compatibility/2006" xmlns:p14="http://schemas.microsoft.com/office/powerpoint/2010/main">
+        <mc:Choice Requires="p14">
+          <p:contentPart p14:bwMode="auto" r:id="rId14">
+            <p14:nvContentPartPr>
+              <p14:cNvPr id="20" name="Ink 19"/>
+              <p14:cNvContentPartPr/>
+              <p14:nvPr/>
+            </p14:nvContentPartPr>
+            <p14:xfrm>
+              <a:off x="7597931" y="5444738"/>
+              <a:ext cx="91800" cy="58680"/>
+            </p14:xfrm>
+          </p:contentPart>
+        </mc:Choice>
+        <mc:Fallback xmlns="">
+          <p:pic>
+            <p:nvPicPr>
+              <p:cNvPr id="20" name="Ink 19"/>
+              <p:cNvPicPr/>
+              <p:nvPr/>
+            </p:nvPicPr>
+            <p:blipFill>
+              <a:blip r:embed="rId15"/>
+              <a:stretch>
+                <a:fillRect/>
+              </a:stretch>
+            </p:blipFill>
+            <p:spPr>
+              <a:xfrm>
+                <a:off x="7586051" y="5432858"/>
+                <a:ext cx="115560" cy="82440"/>
+              </a:xfrm>
+              <a:prstGeom prst="rect">
+                <a:avLst/>
+              </a:prstGeom>
+            </p:spPr>
+          </p:pic>
+        </mc:Fallback>
+      </mc:AlternateContent>
+      <mc:AlternateContent xmlns:mc="http://schemas.openxmlformats.org/markup-compatibility/2006" xmlns:p14="http://schemas.microsoft.com/office/powerpoint/2010/main">
+        <mc:Choice Requires="p14">
+          <p:contentPart p14:bwMode="auto" r:id="rId16">
+            <p14:nvContentPartPr>
+              <p14:cNvPr id="21" name="Ink 20"/>
+              <p14:cNvContentPartPr/>
+              <p14:nvPr/>
+            </p14:nvContentPartPr>
+            <p14:xfrm>
+              <a:off x="7506131" y="5594498"/>
+              <a:ext cx="15120" cy="274680"/>
+            </p14:xfrm>
+          </p:contentPart>
+        </mc:Choice>
+        <mc:Fallback xmlns="">
+          <p:pic>
+            <p:nvPicPr>
+              <p:cNvPr id="21" name="Ink 20"/>
+              <p:cNvPicPr/>
+              <p:nvPr/>
+            </p:nvPicPr>
+            <p:blipFill>
+              <a:blip r:embed="rId17"/>
+              <a:stretch>
+                <a:fillRect/>
+              </a:stretch>
+            </p:blipFill>
+            <p:spPr>
+              <a:xfrm>
+                <a:off x="7494251" y="5582618"/>
+                <a:ext cx="38880" cy="298440"/>
+              </a:xfrm>
+              <a:prstGeom prst="rect">
+                <a:avLst/>
+              </a:prstGeom>
+            </p:spPr>
+          </p:pic>
+        </mc:Fallback>
+      </mc:AlternateContent>
+      <mc:AlternateContent xmlns:mc="http://schemas.openxmlformats.org/markup-compatibility/2006" xmlns:p14="http://schemas.microsoft.com/office/powerpoint/2010/main">
+        <mc:Choice Requires="p14">
+          <p:contentPart p14:bwMode="auto" r:id="rId18">
+            <p14:nvContentPartPr>
+              <p14:cNvPr id="22" name="Ink 21"/>
+              <p14:cNvContentPartPr/>
+              <p14:nvPr/>
+            </p14:nvContentPartPr>
+            <p14:xfrm>
+              <a:off x="7473011" y="5802218"/>
+              <a:ext cx="58680" cy="58680"/>
+            </p14:xfrm>
+          </p:contentPart>
+        </mc:Choice>
+        <mc:Fallback xmlns="">
+          <p:pic>
+            <p:nvPicPr>
+              <p:cNvPr id="22" name="Ink 21"/>
+              <p:cNvPicPr/>
+              <p:nvPr/>
+            </p:nvPicPr>
+            <p:blipFill>
+              <a:blip r:embed="rId19"/>
+              <a:stretch>
+                <a:fillRect/>
+              </a:stretch>
+            </p:blipFill>
+            <p:spPr>
+              <a:xfrm>
+                <a:off x="7461131" y="5790338"/>
+                <a:ext cx="82440" cy="82440"/>
+              </a:xfrm>
+              <a:prstGeom prst="rect">
+                <a:avLst/>
+              </a:prstGeom>
+            </p:spPr>
+          </p:pic>
+        </mc:Fallback>
+      </mc:AlternateContent>
+      <mc:AlternateContent xmlns:mc="http://schemas.openxmlformats.org/markup-compatibility/2006" xmlns:p14="http://schemas.microsoft.com/office/powerpoint/2010/main">
+        <mc:Choice Requires="p14">
+          <p:contentPart p14:bwMode="auto" r:id="rId20">
+            <p14:nvContentPartPr>
+              <p14:cNvPr id="23" name="Ink 22"/>
+              <p14:cNvContentPartPr/>
+              <p14:nvPr/>
+            </p14:nvContentPartPr>
+            <p14:xfrm>
+              <a:off x="7505411" y="5802218"/>
+              <a:ext cx="67680" cy="66960"/>
+            </p14:xfrm>
+          </p:contentPart>
+        </mc:Choice>
+        <mc:Fallback xmlns="">
+          <p:pic>
+            <p:nvPicPr>
+              <p:cNvPr id="23" name="Ink 22"/>
+              <p:cNvPicPr/>
+              <p:nvPr/>
+            </p:nvPicPr>
+            <p:blipFill>
+              <a:blip r:embed="rId21"/>
+              <a:stretch>
+                <a:fillRect/>
+              </a:stretch>
+            </p:blipFill>
+            <p:spPr>
+              <a:xfrm>
+                <a:off x="7493531" y="5790338"/>
+                <a:ext cx="91440" cy="90720"/>
+              </a:xfrm>
+              <a:prstGeom prst="rect">
+                <a:avLst/>
+              </a:prstGeom>
+            </p:spPr>
+          </p:pic>
+        </mc:Fallback>
+      </mc:AlternateContent>
     </p:spTree>
     <p:extLst>
       <p:ext uri="{BB962C8B-B14F-4D97-AF65-F5344CB8AC3E}">
@@ -3798,6 +4646,13 @@
   <p:clrMapOvr>
     <a:masterClrMapping/>
   </p:clrMapOvr>
+  <p:timing>
+    <p:tnLst>
+      <p:par>
+        <p:cTn id="1" dur="indefinite" restart="never" nodeType="tmRoot"/>
+      </p:par>
+    </p:tnLst>
+  </p:timing>
 </p:sld>
 </file>
 
@@ -4414,7 +5269,9 @@
         </p:nvSpPr>
         <p:spPr/>
         <p:txBody>
-          <a:bodyPr/>
+          <a:bodyPr>
+            <a:normAutofit/>
+          </a:bodyPr>
           <a:lstStyle/>
           <a:p>
             <a:r>
@@ -4427,34 +5284,66 @@
           </a:p>
           <a:p>
             <a:r>
+              <a:rPr lang="en-US" dirty="0" smtClean="0">
+                <a:latin typeface="Times New Roman" panose="02020603050405020304" pitchFamily="18" charset="0"/>
+                <a:cs typeface="Times New Roman" panose="02020603050405020304" pitchFamily="18" charset="0"/>
+              </a:rPr>
+              <a:t>Duplicates </a:t>
+            </a:r>
+            <a:r>
               <a:rPr lang="en-US" dirty="0">
                 <a:latin typeface="Times New Roman" panose="02020603050405020304" pitchFamily="18" charset="0"/>
                 <a:cs typeface="Times New Roman" panose="02020603050405020304" pitchFamily="18" charset="0"/>
               </a:rPr>
-              <a:t>Duplicates and similarities –  minor changes that do not affect the user like banners affect machines. Methods to identify this would help in categorizing eURI-Ms into Prima Facie or Possibly Coherent resulting in increased temporal coherence </a:t>
-            </a:r>
-          </a:p>
-          <a:p>
+              <a:t>and similarities </a:t>
+            </a:r>
+            <a:r>
+              <a:rPr lang="en-US" dirty="0" smtClean="0">
+                <a:latin typeface="Times New Roman" panose="02020603050405020304" pitchFamily="18" charset="0"/>
+                <a:cs typeface="Times New Roman" panose="02020603050405020304" pitchFamily="18" charset="0"/>
+              </a:rPr>
+              <a:t>–  every archive adds additional information which is archive specific into memento. This kind of changes do not affect user but would affect machines.</a:t>
+            </a:r>
             <a:r>
               <a:rPr lang="en-US" dirty="0">
                 <a:latin typeface="Times New Roman" panose="02020603050405020304" pitchFamily="18" charset="0"/>
                 <a:cs typeface="Times New Roman" panose="02020603050405020304" pitchFamily="18" charset="0"/>
               </a:rPr>
-              <a:t>Communicating skills – Indicating the coherent status </a:t>
-            </a:r>
-            <a:r>
-              <a:rPr lang="en-US">
-                <a:latin typeface="Times New Roman" panose="02020603050405020304" pitchFamily="18" charset="0"/>
-                <a:cs typeface="Times New Roman" panose="02020603050405020304" pitchFamily="18" charset="0"/>
-              </a:rPr>
-              <a:t>of a memento </a:t>
+              <a:t> </a:t>
+            </a:r>
+            <a:r>
+              <a:rPr lang="en-US" dirty="0" smtClean="0">
+                <a:latin typeface="Times New Roman" panose="02020603050405020304" pitchFamily="18" charset="0"/>
+                <a:cs typeface="Times New Roman" panose="02020603050405020304" pitchFamily="18" charset="0"/>
+              </a:rPr>
+              <a:t>There can be raise </a:t>
             </a:r>
             <a:r>
               <a:rPr lang="en-US" dirty="0">
                 <a:latin typeface="Times New Roman" panose="02020603050405020304" pitchFamily="18" charset="0"/>
                 <a:cs typeface="Times New Roman" panose="02020603050405020304" pitchFamily="18" charset="0"/>
               </a:rPr>
-              <a:t>to the user</a:t>
+              <a:t>in Prima Facie or Possibly </a:t>
+            </a:r>
+            <a:r>
+              <a:rPr lang="en-US" dirty="0" smtClean="0">
+                <a:latin typeface="Times New Roman" panose="02020603050405020304" pitchFamily="18" charset="0"/>
+                <a:cs typeface="Times New Roman" panose="02020603050405020304" pitchFamily="18" charset="0"/>
+              </a:rPr>
+              <a:t>Coherent and decrease in others if this were possible increasing coherence.</a:t>
+            </a:r>
+            <a:endParaRPr lang="en-US" dirty="0">
+              <a:latin typeface="Times New Roman" panose="02020603050405020304" pitchFamily="18" charset="0"/>
+              <a:cs typeface="Times New Roman" panose="02020603050405020304" pitchFamily="18" charset="0"/>
+            </a:endParaRPr>
+          </a:p>
+          <a:p>
+            <a:r>
+              <a:rPr lang="en-US" dirty="0">
+                <a:latin typeface="Times New Roman" panose="02020603050405020304" pitchFamily="18" charset="0"/>
+                <a:cs typeface="Times New Roman" panose="02020603050405020304" pitchFamily="18" charset="0"/>
+              </a:rPr>
+              <a:t>Communicating skills – Indicating the coherent status of a memento to the user</a:t>
             </a:r>
           </a:p>
         </p:txBody>
@@ -4868,6 +5757,193 @@
           </a:p>
           <a:p>
             <a:endParaRPr lang="en-US" sz="1000" dirty="0">
+              <a:latin typeface="Times New Roman" panose="02020603050405020304" pitchFamily="18" charset="0"/>
+              <a:cs typeface="Times New Roman" panose="02020603050405020304" pitchFamily="18" charset="0"/>
+            </a:endParaRPr>
+          </a:p>
+        </p:txBody>
+      </p:sp>
+      <mc:AlternateContent xmlns:mc="http://schemas.openxmlformats.org/markup-compatibility/2006">
+        <mc:Choice xmlns:p14="http://schemas.microsoft.com/office/powerpoint/2010/main" Requires="p14">
+          <p:contentPart p14:bwMode="auto" r:id="rId4">
+            <p14:nvContentPartPr>
+              <p14:cNvPr id="6" name="Ink 5"/>
+              <p14:cNvContentPartPr/>
+              <p14:nvPr/>
+            </p14:nvContentPartPr>
+            <p14:xfrm>
+              <a:off x="4003691" y="3597742"/>
+              <a:ext cx="2269080" cy="1722960"/>
+            </p14:xfrm>
+          </p:contentPart>
+        </mc:Choice>
+        <mc:Fallback>
+          <p:pic>
+            <p:nvPicPr>
+              <p:cNvPr id="6" name="Ink 5"/>
+              <p:cNvPicPr/>
+              <p:nvPr/>
+            </p:nvPicPr>
+            <p:blipFill>
+              <a:blip r:embed="rId5"/>
+              <a:stretch>
+                <a:fillRect/>
+              </a:stretch>
+            </p:blipFill>
+            <p:spPr>
+              <a:xfrm>
+                <a:off x="3991811" y="3585862"/>
+                <a:ext cx="2292840" cy="1746720"/>
+              </a:xfrm>
+              <a:prstGeom prst="rect">
+                <a:avLst/>
+              </a:prstGeom>
+            </p:spPr>
+          </p:pic>
+        </mc:Fallback>
+      </mc:AlternateContent>
+      <p:sp>
+        <p:nvSpPr>
+          <p:cNvPr id="7" name="TextBox 6"/>
+          <p:cNvSpPr txBox="1"/>
+          <p:nvPr/>
+        </p:nvSpPr>
+        <p:spPr>
+          <a:xfrm>
+            <a:off x="586800" y="3582059"/>
+            <a:ext cx="2138727" cy="1754326"/>
+          </a:xfrm>
+          <a:prstGeom prst="rect">
+            <a:avLst/>
+          </a:prstGeom>
+          <a:noFill/>
+        </p:spPr>
+        <p:txBody>
+          <a:bodyPr wrap="none" rtlCol="0">
+            <a:spAutoFit/>
+          </a:bodyPr>
+          <a:lstStyle/>
+          <a:p>
+            <a:r>
+              <a:rPr lang="en-US" sz="1200" dirty="0" smtClean="0">
+                <a:solidFill>
+                  <a:srgbClr val="FF0000"/>
+                </a:solidFill>
+                <a:latin typeface="Times New Roman" panose="02020603050405020304" pitchFamily="18" charset="0"/>
+                <a:cs typeface="Times New Roman" panose="02020603050405020304" pitchFamily="18" charset="0"/>
+              </a:rPr>
+              <a:t>The information shown beside</a:t>
+            </a:r>
+          </a:p>
+          <a:p>
+            <a:r>
+              <a:rPr lang="en-US" sz="1200" dirty="0" smtClean="0">
+                <a:solidFill>
+                  <a:srgbClr val="FF0000"/>
+                </a:solidFill>
+                <a:latin typeface="Times New Roman" panose="02020603050405020304" pitchFamily="18" charset="0"/>
+                <a:cs typeface="Times New Roman" panose="02020603050405020304" pitchFamily="18" charset="0"/>
+              </a:rPr>
+              <a:t> the radar image about </a:t>
+            </a:r>
+          </a:p>
+          <a:p>
+            <a:r>
+              <a:rPr lang="en-US" sz="1200" dirty="0" smtClean="0">
+                <a:solidFill>
+                  <a:srgbClr val="FF0000"/>
+                </a:solidFill>
+                <a:latin typeface="Times New Roman" panose="02020603050405020304" pitchFamily="18" charset="0"/>
+                <a:cs typeface="Times New Roman" panose="02020603050405020304" pitchFamily="18" charset="0"/>
+              </a:rPr>
+              <a:t>the weather is not consistent </a:t>
+            </a:r>
+          </a:p>
+          <a:p>
+            <a:r>
+              <a:rPr lang="en-US" sz="1200" dirty="0">
+                <a:solidFill>
+                  <a:srgbClr val="FF0000"/>
+                </a:solidFill>
+                <a:latin typeface="Times New Roman" panose="02020603050405020304" pitchFamily="18" charset="0"/>
+                <a:cs typeface="Times New Roman" panose="02020603050405020304" pitchFamily="18" charset="0"/>
+              </a:rPr>
+              <a:t>w</a:t>
+            </a:r>
+            <a:r>
+              <a:rPr lang="en-US" sz="1200" dirty="0" smtClean="0">
+                <a:solidFill>
+                  <a:srgbClr val="FF0000"/>
+                </a:solidFill>
+                <a:latin typeface="Times New Roman" panose="02020603050405020304" pitchFamily="18" charset="0"/>
+                <a:cs typeface="Times New Roman" panose="02020603050405020304" pitchFamily="18" charset="0"/>
+              </a:rPr>
+              <a:t>ith the information shown in</a:t>
+            </a:r>
+          </a:p>
+          <a:p>
+            <a:r>
+              <a:rPr lang="en-US" sz="1200" dirty="0" smtClean="0">
+                <a:solidFill>
+                  <a:srgbClr val="FF0000"/>
+                </a:solidFill>
+                <a:latin typeface="Times New Roman" panose="02020603050405020304" pitchFamily="18" charset="0"/>
+                <a:cs typeface="Times New Roman" panose="02020603050405020304" pitchFamily="18" charset="0"/>
+              </a:rPr>
+              <a:t> the image.</a:t>
+            </a:r>
+          </a:p>
+          <a:p>
+            <a:r>
+              <a:rPr lang="en-US" sz="1200" dirty="0" smtClean="0">
+                <a:solidFill>
+                  <a:schemeClr val="accent2"/>
+                </a:solidFill>
+                <a:latin typeface="Times New Roman" panose="02020603050405020304" pitchFamily="18" charset="0"/>
+                <a:cs typeface="Times New Roman" panose="02020603050405020304" pitchFamily="18" charset="0"/>
+              </a:rPr>
+              <a:t>The information says its cloudy</a:t>
+            </a:r>
+          </a:p>
+          <a:p>
+            <a:r>
+              <a:rPr lang="en-US" sz="1200" dirty="0" smtClean="0">
+                <a:solidFill>
+                  <a:schemeClr val="accent2"/>
+                </a:solidFill>
+                <a:latin typeface="Times New Roman" panose="02020603050405020304" pitchFamily="18" charset="0"/>
+                <a:cs typeface="Times New Roman" panose="02020603050405020304" pitchFamily="18" charset="0"/>
+              </a:rPr>
+              <a:t> but the radar image shows </a:t>
+            </a:r>
+          </a:p>
+          <a:p>
+            <a:r>
+              <a:rPr lang="en-US" sz="1200" dirty="0" smtClean="0">
+                <a:solidFill>
+                  <a:schemeClr val="accent2"/>
+                </a:solidFill>
+                <a:latin typeface="Times New Roman" panose="02020603050405020304" pitchFamily="18" charset="0"/>
+                <a:cs typeface="Times New Roman" panose="02020603050405020304" pitchFamily="18" charset="0"/>
+              </a:rPr>
+              <a:t>Otherwise.</a:t>
+            </a:r>
+          </a:p>
+          <a:p>
+            <a:r>
+              <a:rPr lang="en-US" sz="1200" dirty="0" smtClean="0">
+                <a:solidFill>
+                  <a:srgbClr val="FF0000"/>
+                </a:solidFill>
+                <a:latin typeface="Times New Roman" panose="02020603050405020304" pitchFamily="18" charset="0"/>
+                <a:cs typeface="Times New Roman" panose="02020603050405020304" pitchFamily="18" charset="0"/>
+              </a:rPr>
+              <a:t> </a:t>
+            </a:r>
+            <a:endParaRPr lang="en-US" sz="1200" dirty="0">
+              <a:solidFill>
+                <a:srgbClr val="FF0000"/>
+              </a:solidFill>
               <a:latin typeface="Times New Roman" panose="02020603050405020304" pitchFamily="18" charset="0"/>
               <a:cs typeface="Times New Roman" panose="02020603050405020304" pitchFamily="18" charset="0"/>
             </a:endParaRPr>

</xml_diff>